<commit_message>
typografické úpravy (odstraněn ; navíc)
</commit_message>
<xml_diff>
--- a/Presentations/05-RIDICS_Zaklady-XML-TEI-Standard-XML-TEI-Metadata.pptx
+++ b/Presentations/05-RIDICS_Zaklady-XML-TEI-Standard-XML-TEI-Metadata.pptx
@@ -262,7 +262,7 @@
           <a:p>
             <a:fld id="{693D0AAB-BC65-4D93-BE30-329DE1D7C511}" type="datetimeFigureOut">
               <a:rPr lang="cs-CZ" smtClean="0"/>
-              <a:t>06.05.2019</a:t>
+              <a:t>07.05.2019</a:t>
             </a:fld>
             <a:endParaRPr lang="cs-CZ"/>
           </a:p>
@@ -371,7 +371,7 @@
           <a:p>
             <a:fld id="{BF6F0682-C2CD-439F-BD5E-D51593A61157}" type="datetimeFigureOut">
               <a:rPr lang="cs-CZ" smtClean="0"/>
-              <a:t>06.05.2019</a:t>
+              <a:t>07.05.2019</a:t>
             </a:fld>
             <a:endParaRPr lang="cs-CZ"/>
           </a:p>
@@ -11606,7 +11606,7 @@
           <p:nvPr>
             <p:extLst>
               <p:ext uri="{D42A27DB-BD31-4B8C-83A1-F6EECF244321}">
-                <p14:modId xmlns:p14="http://schemas.microsoft.com/office/powerpoint/2010/main" val="1996963863"/>
+                <p14:modId xmlns:p14="http://schemas.microsoft.com/office/powerpoint/2010/main" val="4150742325"/>
               </p:ext>
             </p:extLst>
           </p:nvPr>
@@ -11805,7 +11805,19 @@
                           <a:ea typeface="+mn-ea"/>
                           <a:cs typeface="+mn-cs"/>
                         </a:rPr>
-                        <a:t>objem média, které nese text; může jít o fyzický i digitální objekt (např. počet stran včetně rozměrů rukopisu, počet vět, velikost počítačového souboru v kB ap.);</a:t>
+                        <a:t>objem média, které nese text; může jít o fyzický i digitální objekt (např. počet stran včetně rozměrů rukopisu, počet vět, velikost počítačového souboru v kB </a:t>
+                      </a:r>
+                      <a:r>
+                        <a:rPr lang="cs-CZ" sz="1800" kern="1200">
+                          <a:solidFill>
+                            <a:schemeClr val="tx1"/>
+                          </a:solidFill>
+                          <a:effectLst/>
+                          <a:latin typeface="+mn-lt"/>
+                          <a:ea typeface="+mn-ea"/>
+                          <a:cs typeface="+mn-cs"/>
+                        </a:rPr>
+                        <a:t>ap.)</a:t>
                       </a:r>
                       <a:endParaRPr lang="cs-CZ" dirty="0"/>
                     </a:p>

</xml_diff>

<commit_message>
oprava překlepů, vylepšení formulací a zpracování (hypertextových odkazů)
</commit_message>
<xml_diff>
--- a/Presentations/05-RIDICS_Zaklady-XML-TEI-Standard-XML-TEI-Metadata.pptx
+++ b/Presentations/05-RIDICS_Zaklady-XML-TEI-Standard-XML-TEI-Metadata.pptx
@@ -262,7 +262,7 @@
           <a:p>
             <a:fld id="{693D0AAB-BC65-4D93-BE30-329DE1D7C511}" type="datetimeFigureOut">
               <a:rPr lang="cs-CZ" smtClean="0"/>
-              <a:t>07.05.2019</a:t>
+              <a:t>09.05.2019</a:t>
             </a:fld>
             <a:endParaRPr lang="cs-CZ"/>
           </a:p>
@@ -371,7 +371,7 @@
           <a:p>
             <a:fld id="{BF6F0682-C2CD-439F-BD5E-D51593A61157}" type="datetimeFigureOut">
               <a:rPr lang="cs-CZ" smtClean="0"/>
-              <a:t>07.05.2019</a:t>
+              <a:t>09.05.2019</a:t>
             </a:fld>
             <a:endParaRPr lang="cs-CZ"/>
           </a:p>
@@ -10723,7 +10723,7 @@
           <p:nvPr>
             <p:extLst>
               <p:ext uri="{D42A27DB-BD31-4B8C-83A1-F6EECF244321}">
-                <p14:modId xmlns:p14="http://schemas.microsoft.com/office/powerpoint/2010/main" val="3207313715"/>
+                <p14:modId xmlns:p14="http://schemas.microsoft.com/office/powerpoint/2010/main" val="4161319009"/>
               </p:ext>
             </p:extLst>
           </p:nvPr>
@@ -11382,7 +11382,7 @@
                         <a:rPr lang="cs-CZ" sz="1800" u="none" strike="noStrike" dirty="0">
                           <a:effectLst/>
                         </a:rPr>
-                        <a:t>formální a prozaický popis, jaký způsobem se vytvářejí identifikátory</a:t>
+                        <a:t>formální a prozaický popis, jakým způsobem se vytvářejí identifikátory</a:t>
                       </a:r>
                       <a:endParaRPr lang="cs-CZ" sz="1800" b="0" i="0" u="none" strike="noStrike" dirty="0">
                         <a:solidFill>
@@ -12456,7 +12456,7 @@
           <p:nvPr>
             <p:extLst>
               <p:ext uri="{D42A27DB-BD31-4B8C-83A1-F6EECF244321}">
-                <p14:modId xmlns:p14="http://schemas.microsoft.com/office/powerpoint/2010/main" val="3359374451"/>
+                <p14:modId xmlns:p14="http://schemas.microsoft.com/office/powerpoint/2010/main" val="2936025681"/>
               </p:ext>
             </p:extLst>
           </p:nvPr>
@@ -12586,7 +12586,7 @@
                         <a:rPr lang="cs-CZ" sz="1800" u="none" strike="noStrike" dirty="0">
                           <a:effectLst/>
                         </a:rPr>
-                        <a:t>popis důvodů a způsobu při výběru vzorků do korpusu nebo kolekce textů</a:t>
+                        <a:t>popis důvodů a postupu při výběru vzorků do korpusu nebo kolekce textů</a:t>
                       </a:r>
                       <a:endParaRPr lang="cs-CZ" sz="1800" b="0" i="0" u="none" strike="noStrike" dirty="0">
                         <a:solidFill>
@@ -14320,7 +14320,7 @@
           <p:nvPr>
             <p:extLst>
               <p:ext uri="{D42A27DB-BD31-4B8C-83A1-F6EECF244321}">
-                <p14:modId xmlns:p14="http://schemas.microsoft.com/office/powerpoint/2010/main" val="246873037"/>
+                <p14:modId xmlns:p14="http://schemas.microsoft.com/office/powerpoint/2010/main" val="3216535857"/>
               </p:ext>
             </p:extLst>
           </p:nvPr>
@@ -14418,13 +14418,13 @@
                         <a:t>&lt;</a:t>
                       </a:r>
                       <a:r>
-                        <a:rPr lang="cs-CZ" sz="1800" u="none" strike="noStrike" dirty="0" err="1">
-                          <a:effectLst/>
+                        <a:rPr lang="cs-CZ">
+                          <a:hlinkClick r:id="rId4" tooltip="documents a change or set of changes made during the production of a source document, or during the revision of an electronic file."/>
                         </a:rPr>
                         <a:t>change</a:t>
                       </a:r>
                       <a:r>
-                        <a:rPr lang="cs-CZ" sz="1800" u="none" strike="noStrike" dirty="0">
+                        <a:rPr lang="cs-CZ" sz="1800" u="none" strike="noStrike">
                           <a:effectLst/>
                         </a:rPr>
                         <a:t>&gt;</a:t>
@@ -14477,12 +14477,24 @@
                     <a:p>
                       <a:pPr algn="l" fontAlgn="b"/>
                       <a:r>
-                        <a:rPr lang="cs-CZ" sz="1800" u="none" strike="noStrike">
+                        <a:rPr lang="cs-CZ" sz="1800" u="none" strike="noStrike" dirty="0">
                           <a:effectLst/>
                         </a:rPr>
-                        <a:t>&lt;list&gt;</a:t>
-                      </a:r>
-                      <a:endParaRPr lang="cs-CZ" sz="1800" b="0" i="0" u="none" strike="noStrike">
+                        <a:t>&lt;</a:t>
+                      </a:r>
+                      <a:r>
+                        <a:rPr lang="cs-CZ" dirty="0">
+                          <a:hlinkClick r:id="rId5" tooltip="contains any sequence of items organized as a list."/>
+                        </a:rPr>
+                        <a:t>list</a:t>
+                      </a:r>
+                      <a:r>
+                        <a:rPr lang="cs-CZ" sz="1800" u="none" strike="noStrike" dirty="0">
+                          <a:effectLst/>
+                        </a:rPr>
+                        <a:t>&gt;</a:t>
+                      </a:r>
+                      <a:endParaRPr lang="cs-CZ" sz="1800" b="0" i="0" u="none" strike="noStrike" dirty="0">
                         <a:solidFill>
                           <a:srgbClr val="000000"/>
                         </a:solidFill>
@@ -14563,12 +14575,24 @@
                     <a:p>
                       <a:pPr algn="l" fontAlgn="b"/>
                       <a:r>
-                        <a:rPr lang="cs-CZ" sz="1800" u="none" strike="noStrike">
+                        <a:rPr lang="cs-CZ" sz="1800" u="none" strike="noStrike" dirty="0">
                           <a:effectLst/>
                         </a:rPr>
-                        <a:t>&lt;listChange&gt;</a:t>
-                      </a:r>
-                      <a:endParaRPr lang="cs-CZ" sz="1800" b="0" i="0" u="none" strike="noStrike">
+                        <a:t>&lt;</a:t>
+                      </a:r>
+                      <a:r>
+                        <a:rPr lang="cs-CZ" dirty="0" err="1">
+                          <a:hlinkClick r:id="rId6" tooltip="groups a number of change descriptions associated with either the creation of a source text or the revision of an encoded text."/>
+                        </a:rPr>
+                        <a:t>listChange</a:t>
+                      </a:r>
+                      <a:r>
+                        <a:rPr lang="cs-CZ" sz="1800" u="none" strike="noStrike" dirty="0">
+                          <a:effectLst/>
+                        </a:rPr>
+                        <a:t>&gt;</a:t>
+                      </a:r>
+                      <a:endParaRPr lang="cs-CZ" sz="1800" b="0" i="0" u="none" strike="noStrike" dirty="0">
                         <a:solidFill>
                           <a:srgbClr val="000000"/>
                         </a:solidFill>
@@ -14589,19 +14613,7 @@
                         <a:rPr lang="cs-CZ" sz="1800" u="none" strike="noStrike" dirty="0">
                           <a:effectLst/>
                         </a:rPr>
-                        <a:t>seskupuje více změn, </a:t>
-                      </a:r>
-                      <a:r>
-                        <a:rPr lang="cs-CZ" sz="1800" u="none" strike="noStrike">
-                          <a:effectLst/>
-                        </a:rPr>
-                        <a:t>k nimž </a:t>
-                      </a:r>
-                      <a:r>
-                        <a:rPr lang="cs-CZ" sz="1800" u="none" strike="noStrike" dirty="0">
-                          <a:effectLst/>
-                        </a:rPr>
-                        <a:t>docházelo při vzniku elektronické edice nebo při jejích revizích</a:t>
+                        <a:t>seskupuje více změn, k nimž docházelo při vzniku elektronické edice nebo při jejích revizích</a:t>
                       </a:r>
                       <a:endParaRPr lang="en-US" sz="1800" b="0" i="0" u="none" strike="noStrike" dirty="0">
                         <a:solidFill>

</xml_diff>